<commit_message>
Update 9-IBFE with Advection and Diffusion.pptx
</commit_message>
<xml_diff>
--- a/IBFE Lectures/9-IBFE with Advection and Diffusion.pptx
+++ b/IBFE Lectures/9-IBFE with Advection and Diffusion.pptx
@@ -6,7 +6,7 @@
     <p:sldMasterId id="2147483671" r:id="rId2"/>
   </p:sldMasterIdLst>
   <p:notesMasterIdLst>
-    <p:notesMasterId r:id="rId20"/>
+    <p:notesMasterId r:id="rId21"/>
   </p:notesMasterIdLst>
   <p:sldIdLst>
     <p:sldId id="256" r:id="rId3"/>
@@ -26,6 +26,7 @@
     <p:sldId id="269" r:id="rId17"/>
     <p:sldId id="270" r:id="rId18"/>
     <p:sldId id="271" r:id="rId19"/>
+    <p:sldId id="273" r:id="rId20"/>
   </p:sldIdLst>
   <p:sldSz cx="9144000" cy="5143500" type="screen16x9"/>
   <p:notesSz cx="6858000" cy="9144000"/>
@@ -258,6 +259,11 @@
       </a:defRPr>
     </a:lvl9pPr>
   </p:defaultTextStyle>
+  <p:extLst>
+    <p:ext uri="{EFAFB233-063F-42B5-8137-9DF3F51BA10A}">
+      <p15:sldGuideLst xmlns:p15="http://schemas.microsoft.com/office/powerpoint/2012/main"/>
+    </p:ext>
+  </p:extLst>
 </p:presentation>
 </file>
 
@@ -13722,14 +13728,14 @@
               <a:buNone/>
             </a:pPr>
             <a:r>
-              <a:rPr lang="en" sz="2000">
+              <a:rPr lang="en" sz="2000" dirty="0">
                 <a:solidFill>
                   <a:srgbClr val="000000"/>
                 </a:solidFill>
               </a:rPr>
               <a:t>Include headers for advection diffusion solver near top.</a:t>
             </a:r>
-            <a:endParaRPr sz="2000">
+            <a:endParaRPr sz="2000" dirty="0">
               <a:solidFill>
                 <a:srgbClr val="000000"/>
               </a:solidFill>
@@ -13751,10 +13757,10 @@
               <a:buNone/>
             </a:pPr>
             <a:r>
-              <a:rPr lang="en" sz="1600"/>
+              <a:rPr lang="en" sz="1600" dirty="0"/>
               <a:t>// Headers for application-specific algorithm/data structure objects</a:t>
             </a:r>
-            <a:endParaRPr sz="1600"/>
+            <a:endParaRPr sz="1600" dirty="0"/>
           </a:p>
           <a:p>
             <a:pPr marL="0" lvl="0" indent="0" algn="l" rtl="0">
@@ -13772,10 +13778,10 @@
               <a:buNone/>
             </a:pPr>
             <a:r>
-              <a:rPr lang="en" sz="1600"/>
+              <a:rPr lang="en" sz="1600" dirty="0"/>
               <a:t>#include &lt;ibamr/AdvDiffPredictorCorrectorHierarchyIntegrator.h&gt;</a:t>
             </a:r>
-            <a:endParaRPr sz="1600"/>
+            <a:endParaRPr sz="1600" dirty="0"/>
           </a:p>
           <a:p>
             <a:pPr marL="0" lvl="0" indent="0" algn="l" rtl="0">
@@ -13788,10 +13794,10 @@
               <a:buNone/>
             </a:pPr>
             <a:r>
-              <a:rPr lang="en" sz="1600"/>
+              <a:rPr lang="en" sz="1600" dirty="0"/>
               <a:t>#include &lt;ibamr/AdvDiffSemiImplicitHierarchyIntegrator.h&gt;</a:t>
             </a:r>
-            <a:endParaRPr sz="1600"/>
+            <a:endParaRPr sz="1600" dirty="0"/>
           </a:p>
         </p:txBody>
       </p:sp>
@@ -13897,10 +13903,10 @@
               <a:buNone/>
             </a:pPr>
             <a:r>
-              <a:rPr lang="en" sz="1000"/>
+              <a:rPr lang="en" sz="1000" dirty="0"/>
               <a:t> const bool periodic_domain = grid_geometry-&gt;getPeriodicShift().min() &gt; 0;</a:t>
             </a:r>
-            <a:endParaRPr sz="1000"/>
+            <a:endParaRPr sz="1000" dirty="0"/>
           </a:p>
           <a:p>
             <a:pPr marL="0" lvl="0" indent="0" algn="l" rtl="0">
@@ -13912,7 +13918,7 @@
               </a:spcAft>
               <a:buNone/>
             </a:pPr>
-            <a:endParaRPr sz="1000"/>
+            <a:endParaRPr sz="1000" dirty="0"/>
           </a:p>
           <a:p>
             <a:pPr marL="0" lvl="0" indent="0" algn="l" rtl="0">
@@ -13930,10 +13936,10 @@
               <a:buNone/>
             </a:pPr>
             <a:r>
-              <a:rPr lang="en" sz="1000"/>
+              <a:rPr lang="en" sz="1000" dirty="0"/>
               <a:t>  // Setup the advected and diffused quantity.</a:t>
             </a:r>
-            <a:endParaRPr sz="1000"/>
+            <a:endParaRPr sz="1000" dirty="0"/>
           </a:p>
           <a:p>
             <a:pPr marL="0" lvl="0" indent="0" algn="l" rtl="0">
@@ -13951,10 +13957,10 @@
               <a:buNone/>
             </a:pPr>
             <a:r>
-              <a:rPr lang="en" sz="1000"/>
+              <a:rPr lang="en" sz="1000" dirty="0"/>
               <a:t>	Pointer&lt;CellVariable&lt;NDIM,double&gt; &gt; T_var = new CellVariable&lt;NDIM,double&gt;("T");</a:t>
             </a:r>
-            <a:endParaRPr sz="1000"/>
+            <a:endParaRPr sz="1000" dirty="0"/>
           </a:p>
           <a:p>
             <a:pPr marL="0" lvl="0" indent="0" algn="l" rtl="0">
@@ -13972,10 +13978,10 @@
               <a:buNone/>
             </a:pPr>
             <a:r>
-              <a:rPr lang="en" sz="1000"/>
+              <a:rPr lang="en" sz="1000" dirty="0"/>
               <a:t>	adv_diff_integrator-&gt;registerTransportedQuantity(T_var);</a:t>
             </a:r>
-            <a:endParaRPr sz="1000"/>
+            <a:endParaRPr sz="1000" dirty="0"/>
           </a:p>
           <a:p>
             <a:pPr marL="0" lvl="0" indent="0" algn="l" rtl="0">
@@ -13993,10 +13999,10 @@
               <a:buNone/>
             </a:pPr>
             <a:r>
-              <a:rPr lang="en" sz="1000"/>
+              <a:rPr lang="en" sz="1000" dirty="0"/>
               <a:t>	adv_diff_integrator-&gt;setDiffusionCoefficient(T_var, input_db-&gt;getDouble("KAPPA"));</a:t>
             </a:r>
-            <a:endParaRPr sz="1000"/>
+            <a:endParaRPr sz="1000" dirty="0"/>
           </a:p>
           <a:p>
             <a:pPr marL="0" lvl="0" indent="0" algn="l" rtl="0">
@@ -14014,10 +14020,10 @@
               <a:buNone/>
             </a:pPr>
             <a:r>
-              <a:rPr lang="en" sz="1000"/>
+              <a:rPr lang="en" sz="1000" dirty="0"/>
               <a:t>	adv_diff_integrator-&gt;setInitialConditions(T_var, new muParserCartGridFunction("T_init", app_initializer-&gt;getComponentDatabase("TemperatureInitialConditions"), grid_geometry));</a:t>
             </a:r>
-            <a:endParaRPr sz="1000"/>
+            <a:endParaRPr sz="1000" dirty="0"/>
           </a:p>
           <a:p>
             <a:pPr marL="0" lvl="0" indent="0" algn="l" rtl="0">
@@ -14035,10 +14041,10 @@
               <a:buNone/>
             </a:pPr>
             <a:r>
-              <a:rPr lang="en" sz="1000"/>
+              <a:rPr lang="en" sz="1000" dirty="0"/>
               <a:t>	RobinBcCoefStrategy&lt;NDIM&gt;* T_bc_coef = NULL;</a:t>
             </a:r>
-            <a:endParaRPr sz="1000"/>
+            <a:endParaRPr sz="1000" dirty="0"/>
           </a:p>
           <a:p>
             <a:pPr marL="0" lvl="0" indent="0" algn="l" rtl="0">
@@ -14056,10 +14062,10 @@
               <a:buNone/>
             </a:pPr>
             <a:r>
-              <a:rPr lang="en" sz="1000"/>
+              <a:rPr lang="en" sz="1000" dirty="0"/>
               <a:t>	if (!periodic_domain)</a:t>
             </a:r>
-            <a:endParaRPr sz="1000"/>
+            <a:endParaRPr sz="1000" dirty="0"/>
           </a:p>
           <a:p>
             <a:pPr marL="0" lvl="0" indent="0" algn="l" rtl="0">
@@ -14077,10 +14083,10 @@
               <a:buNone/>
             </a:pPr>
             <a:r>
-              <a:rPr lang="en" sz="1000"/>
+              <a:rPr lang="en" sz="1000" dirty="0"/>
               <a:t>  	{</a:t>
             </a:r>
-            <a:endParaRPr sz="1000"/>
+            <a:endParaRPr sz="1000" dirty="0"/>
           </a:p>
           <a:p>
             <a:pPr marL="0" lvl="0" indent="457200" algn="l" rtl="0">
@@ -14098,10 +14104,10 @@
               <a:buNone/>
             </a:pPr>
             <a:r>
-              <a:rPr lang="en" sz="1000"/>
+              <a:rPr lang="en" sz="1000" dirty="0"/>
               <a:t>T_bc_coef = new muParserRobinBcCoefs("T_bc_coef", app_initializer-&gt;getComponentDatabase("TemperatureBcCoefs"), grid_geometry);</a:t>
             </a:r>
-            <a:endParaRPr sz="1000"/>
+            <a:endParaRPr sz="1000" dirty="0"/>
           </a:p>
           <a:p>
             <a:pPr marL="0" lvl="0" indent="457200" algn="l" rtl="0">
@@ -14119,10 +14125,10 @@
               <a:buNone/>
             </a:pPr>
             <a:r>
-              <a:rPr lang="en" sz="1000"/>
+              <a:rPr lang="en" sz="1000" dirty="0"/>
               <a:t>adv_diff_integrator-&gt;setPhysicalBcCoef(T_var, T_bc_coef);</a:t>
             </a:r>
-            <a:endParaRPr sz="1000"/>
+            <a:endParaRPr sz="1000" dirty="0"/>
           </a:p>
           <a:p>
             <a:pPr marL="0" lvl="0" indent="0" algn="l" rtl="0">
@@ -14140,10 +14146,10 @@
               <a:buNone/>
             </a:pPr>
             <a:r>
-              <a:rPr lang="en" sz="1000"/>
+              <a:rPr lang="en" sz="1000" dirty="0"/>
               <a:t>  	}</a:t>
             </a:r>
-            <a:endParaRPr sz="1000"/>
+            <a:endParaRPr sz="1000" dirty="0"/>
           </a:p>
           <a:p>
             <a:pPr marL="0" lvl="0" indent="0" algn="l" rtl="0">
@@ -14156,10 +14162,10 @@
               <a:buNone/>
             </a:pPr>
             <a:r>
-              <a:rPr lang="en" sz="1000"/>
+              <a:rPr lang="en" sz="1000" dirty="0"/>
               <a:t>	adv_diff_integrator-&gt;setAdvectionVelocity(T_var, navier_stokes_integrator-&gt;getAdvectionVelocityVariable());</a:t>
             </a:r>
-            <a:endParaRPr sz="1000"/>
+            <a:endParaRPr sz="1000" dirty="0"/>
           </a:p>
         </p:txBody>
       </p:sp>
@@ -16765,6 +16771,258 @@
         </p:txBody>
       </p:sp>
     </p:spTree>
+  </p:cSld>
+  <p:clrMapOvr>
+    <a:masterClrMapping/>
+  </p:clrMapOvr>
+</p:sld>
+</file>
+
+<file path=ppt/slides/slide18.xml><?xml version="1.0" encoding="utf-8"?>
+<p:sld xmlns:a="http://schemas.openxmlformats.org/drawingml/2006/main" xmlns:r="http://schemas.openxmlformats.org/officeDocument/2006/relationships" xmlns:p="http://schemas.openxmlformats.org/presentationml/2006/main">
+  <p:cSld>
+    <p:spTree>
+      <p:nvGrpSpPr>
+        <p:cNvPr id="1" name=""/>
+        <p:cNvGrpSpPr/>
+        <p:nvPr/>
+      </p:nvGrpSpPr>
+      <p:grpSpPr>
+        <a:xfrm>
+          <a:off x="0" y="0"/>
+          <a:ext cx="0" cy="0"/>
+          <a:chOff x="0" y="0"/>
+          <a:chExt cx="0" cy="0"/>
+        </a:xfrm>
+      </p:grpSpPr>
+      <p:sp>
+        <p:nvSpPr>
+          <p:cNvPr id="2" name="Title 1"/>
+          <p:cNvSpPr>
+            <a:spLocks noGrp="1"/>
+          </p:cNvSpPr>
+          <p:nvPr>
+            <p:ph type="title"/>
+          </p:nvPr>
+        </p:nvSpPr>
+        <p:spPr/>
+        <p:txBody>
+          <a:bodyPr/>
+          <a:lstStyle/>
+          <a:p>
+            <a:r>
+              <a:rPr lang="en-US" dirty="0" smtClean="0"/>
+              <a:t>Rescaling </a:t>
+            </a:r>
+            <a:r>
+              <a:rPr lang="en-US" dirty="0" err="1" smtClean="0"/>
+              <a:t>kappa_spring</a:t>
+            </a:r>
+            <a:r>
+              <a:rPr lang="en-US" dirty="0" smtClean="0"/>
+              <a:t> and the elastic modulus</a:t>
+            </a:r>
+            <a:endParaRPr lang="en-US" dirty="0"/>
+          </a:p>
+        </p:txBody>
+      </p:sp>
+      <p:sp>
+        <p:nvSpPr>
+          <p:cNvPr id="3" name="Text Placeholder 2"/>
+          <p:cNvSpPr>
+            <a:spLocks noGrp="1"/>
+          </p:cNvSpPr>
+          <p:nvPr>
+            <p:ph type="body" idx="1"/>
+          </p:nvPr>
+        </p:nvSpPr>
+        <p:spPr/>
+        <p:txBody>
+          <a:bodyPr/>
+          <a:lstStyle/>
+          <a:p>
+            <a:r>
+              <a:rPr lang="en-US" dirty="0" smtClean="0"/>
+              <a:t>F=</a:t>
+            </a:r>
+            <a:r>
+              <a:rPr lang="en-US" dirty="0" err="1" smtClean="0"/>
+              <a:t>kx</a:t>
+            </a:r>
+            <a:endParaRPr lang="en-US" dirty="0" smtClean="0"/>
+          </a:p>
+          <a:p>
+            <a:r>
+              <a:rPr lang="en-US" dirty="0" err="1" smtClean="0"/>
+              <a:t>k_new</a:t>
+            </a:r>
+            <a:r>
+              <a:rPr lang="en-US" dirty="0" smtClean="0"/>
+              <a:t> = (</a:t>
+            </a:r>
+            <a:r>
+              <a:rPr lang="en-US" dirty="0" err="1" smtClean="0"/>
+              <a:t>k_old</a:t>
+            </a:r>
+            <a:r>
+              <a:rPr lang="en-US" dirty="0" smtClean="0"/>
+              <a:t>*(</a:t>
+            </a:r>
+            <a:r>
+              <a:rPr lang="en-US" dirty="0" err="1" smtClean="0"/>
+              <a:t>F_new</a:t>
+            </a:r>
+            <a:r>
+              <a:rPr lang="en-US" dirty="0" smtClean="0"/>
+              <a:t>/</a:t>
+            </a:r>
+            <a:r>
+              <a:rPr lang="en-US" dirty="0" err="1" smtClean="0"/>
+              <a:t>F_old</a:t>
+            </a:r>
+            <a:r>
+              <a:rPr lang="en-US" dirty="0" smtClean="0"/>
+              <a:t>))*(</a:t>
+            </a:r>
+            <a:r>
+              <a:rPr lang="en-US" dirty="0" err="1" smtClean="0"/>
+              <a:t>ds_old</a:t>
+            </a:r>
+            <a:r>
+              <a:rPr lang="en-US" dirty="0" smtClean="0"/>
+              <a:t>/</a:t>
+            </a:r>
+            <a:r>
+              <a:rPr lang="en-US" dirty="0" err="1" smtClean="0"/>
+              <a:t>ds_new</a:t>
+            </a:r>
+            <a:r>
+              <a:rPr lang="en-US" dirty="0" smtClean="0"/>
+              <a:t>)</a:t>
+            </a:r>
+          </a:p>
+          <a:p>
+            <a:r>
+              <a:rPr lang="en-US" dirty="0" smtClean="0"/>
+              <a:t>F ~ rho*L*U^2</a:t>
+            </a:r>
+          </a:p>
+          <a:p>
+            <a:endParaRPr lang="en-US" dirty="0"/>
+          </a:p>
+          <a:p>
+            <a:r>
+              <a:rPr lang="en-US" dirty="0" smtClean="0"/>
+              <a:t>Elastic modulus – try leaving it the same. Scale mu and beta with e.</a:t>
+            </a:r>
+          </a:p>
+          <a:p>
+            <a:pPr lvl="1">
+              <a:spcBef>
+                <a:spcPts val="0"/>
+              </a:spcBef>
+            </a:pPr>
+            <a:r>
+              <a:rPr lang="en-US" dirty="0"/>
+              <a:t>NU=0.3</a:t>
+            </a:r>
+          </a:p>
+          <a:p>
+            <a:pPr lvl="1">
+              <a:spcBef>
+                <a:spcPts val="0"/>
+              </a:spcBef>
+            </a:pPr>
+            <a:r>
+              <a:rPr lang="en-US" dirty="0" smtClean="0"/>
+              <a:t>E_STEM=1.0e7</a:t>
+            </a:r>
+          </a:p>
+          <a:p>
+            <a:pPr lvl="1">
+              <a:spcBef>
+                <a:spcPts val="0"/>
+              </a:spcBef>
+            </a:pPr>
+            <a:r>
+              <a:rPr lang="en-US" dirty="0" smtClean="0"/>
+              <a:t>E_LEAF=1.0e7</a:t>
+            </a:r>
+          </a:p>
+          <a:p>
+            <a:pPr lvl="1">
+              <a:spcBef>
+                <a:spcPts val="0"/>
+              </a:spcBef>
+            </a:pPr>
+            <a:r>
+              <a:rPr lang="en-US" dirty="0" smtClean="0"/>
+              <a:t>MU_LEAF </a:t>
+            </a:r>
+            <a:r>
+              <a:rPr lang="en-US" dirty="0"/>
+              <a:t>= E_LEAF/(2.0*(1.0+NU)) </a:t>
+            </a:r>
+            <a:endParaRPr lang="en-US" dirty="0" smtClean="0"/>
+          </a:p>
+          <a:p>
+            <a:pPr lvl="1">
+              <a:spcBef>
+                <a:spcPts val="0"/>
+              </a:spcBef>
+            </a:pPr>
+            <a:r>
+              <a:rPr lang="en-US" dirty="0" smtClean="0"/>
+              <a:t>MU_STEM </a:t>
+            </a:r>
+            <a:r>
+              <a:rPr lang="en-US" dirty="0"/>
+              <a:t>= E_STEM/(2.0*(1.0+NU)) </a:t>
+            </a:r>
+            <a:endParaRPr lang="en-US" dirty="0" smtClean="0"/>
+          </a:p>
+          <a:p>
+            <a:pPr lvl="1">
+              <a:spcBef>
+                <a:spcPts val="0"/>
+              </a:spcBef>
+            </a:pPr>
+            <a:r>
+              <a:rPr lang="en-US" dirty="0" smtClean="0"/>
+              <a:t>BETA_STEM </a:t>
+            </a:r>
+            <a:r>
+              <a:rPr lang="en-US" dirty="0"/>
+              <a:t>= E_STEM*NU/((1.0 + NU)*(1.0 - 2.0*NU</a:t>
+            </a:r>
+            <a:r>
+              <a:rPr lang="en-US" dirty="0" smtClean="0"/>
+              <a:t>))</a:t>
+            </a:r>
+          </a:p>
+          <a:p>
+            <a:pPr lvl="1">
+              <a:spcBef>
+                <a:spcPts val="0"/>
+              </a:spcBef>
+            </a:pPr>
+            <a:r>
+              <a:rPr lang="en-US" dirty="0" smtClean="0"/>
+              <a:t>BETA_LEAF </a:t>
+            </a:r>
+            <a:r>
+              <a:rPr lang="en-US" dirty="0"/>
+              <a:t>= E_LEAF*NU/((1.0 + NU)*(1.0 - 2.0*NU))</a:t>
+            </a:r>
+          </a:p>
+        </p:txBody>
+      </p:sp>
+    </p:spTree>
+    <p:extLst>
+      <p:ext uri="{BB962C8B-B14F-4D97-AF65-F5344CB8AC3E}">
+        <p14:creationId xmlns:p14="http://schemas.microsoft.com/office/powerpoint/2010/main" val="627197040"/>
+      </p:ext>
+    </p:extLst>
   </p:cSld>
   <p:clrMapOvr>
     <a:masterClrMapping/>
@@ -18240,11 +18498,6 @@
               </a:rPr>
               <a:t>}</a:t>
             </a:r>
-            <a:endParaRPr lang="en-US" sz="1200" dirty="0">
-              <a:solidFill>
-                <a:srgbClr val="434343"/>
-              </a:solidFill>
-            </a:endParaRPr>
           </a:p>
         </p:txBody>
       </p:sp>
@@ -18391,7 +18644,7 @@
               <a:buChar char="●"/>
             </a:pPr>
             <a:r>
-              <a:rPr lang="en" sz="1800" b="0" i="0" u="none" strike="noStrike" cap="none">
+              <a:rPr lang="en" sz="1800" b="0" i="0" u="none" strike="noStrike" cap="none" dirty="0">
                 <a:solidFill>
                   <a:schemeClr val="dk1"/>
                 </a:solidFill>
@@ -18402,7 +18655,7 @@
               </a:rPr>
               <a:t>Robin boundary conditions are a weighted combination of Dirichlet boundary conditions and Neumann boundary conditions. </a:t>
             </a:r>
-            <a:endParaRPr sz="1800" b="0" i="0" u="none" strike="noStrike" cap="none">
+            <a:endParaRPr sz="1800" b="0" i="0" u="none" strike="noStrike" cap="none" dirty="0">
               <a:solidFill>
                 <a:schemeClr val="dk1"/>
               </a:solidFill>
@@ -18427,7 +18680,7 @@
               <a:buChar char="●"/>
             </a:pPr>
             <a:r>
-              <a:rPr lang="en" sz="1800" b="0" i="0" u="none" strike="noStrike" cap="none">
+              <a:rPr lang="en" sz="1800" b="0" i="0" u="none" strike="noStrike" cap="none" dirty="0">
                 <a:solidFill>
                   <a:schemeClr val="dk1"/>
                 </a:solidFill>
@@ -18438,7 +18691,7 @@
               </a:rPr>
               <a:t>If Ω is the domain on which the given equation is to be solved and ∂Ω denotes its boundary, the Robin boundary condition is:</a:t>
             </a:r>
-            <a:endParaRPr sz="1800" b="0" i="0" u="none" strike="noStrike" cap="none">
+            <a:endParaRPr sz="1800" b="0" i="0" u="none" strike="noStrike" cap="none" dirty="0">
               <a:solidFill>
                 <a:schemeClr val="dk1"/>
               </a:solidFill>
@@ -18458,7 +18711,7 @@
               </a:spcAft>
               <a:buNone/>
             </a:pPr>
-            <a:endParaRPr sz="1800"/>
+            <a:endParaRPr sz="1800" dirty="0"/>
           </a:p>
           <a:p>
             <a:pPr marL="0" marR="0" lvl="0" indent="0" algn="l" rtl="0">
@@ -18470,7 +18723,7 @@
               </a:spcAft>
               <a:buNone/>
             </a:pPr>
-            <a:endParaRPr sz="1800"/>
+            <a:endParaRPr sz="1800" dirty="0"/>
           </a:p>
           <a:p>
             <a:pPr marL="0" marR="0" lvl="0" indent="0" algn="l" rtl="0">
@@ -18482,7 +18735,7 @@
               </a:spcAft>
               <a:buNone/>
             </a:pPr>
-            <a:endParaRPr sz="1800" b="0" i="0" u="none" strike="noStrike" cap="none">
+            <a:endParaRPr sz="1800" b="0" i="0" u="none" strike="noStrike" cap="none" dirty="0">
               <a:solidFill>
                 <a:schemeClr val="dk1"/>
               </a:solidFill>
@@ -18507,7 +18760,7 @@
               <a:buChar char="○"/>
             </a:pPr>
             <a:r>
-              <a:rPr lang="en" sz="1800" b="0" i="0" u="none" strike="noStrike" cap="none">
+              <a:rPr lang="en" sz="1800" b="0" i="0" u="none" strike="noStrike" cap="none" dirty="0">
                 <a:solidFill>
                   <a:schemeClr val="dk1"/>
                 </a:solidFill>
@@ -18519,11 +18772,11 @@
               <a:t>for some non-zero constants</a:t>
             </a:r>
             <a:r>
-              <a:rPr lang="en" sz="1800"/>
+              <a:rPr lang="en" sz="1800" dirty="0"/>
               <a:t> a and b </a:t>
             </a:r>
             <a:r>
-              <a:rPr lang="en" sz="1800" b="0" i="0" u="none" strike="noStrike" cap="none">
+              <a:rPr lang="en" sz="1800" b="0" i="0" u="none" strike="noStrike" cap="none" dirty="0">
                 <a:solidFill>
                   <a:schemeClr val="dk1"/>
                 </a:solidFill>
@@ -18535,11 +18788,11 @@
               <a:t>and a given function</a:t>
             </a:r>
             <a:r>
-              <a:rPr lang="en" sz="1800"/>
+              <a:rPr lang="en" sz="1800" dirty="0"/>
               <a:t> g defined on</a:t>
             </a:r>
             <a:r>
-              <a:rPr lang="en" sz="1800" b="0" i="0" u="none" strike="noStrike" cap="none">
+              <a:rPr lang="en" sz="1800" b="0" i="0" u="none" strike="noStrike" cap="none" dirty="0">
                 <a:solidFill>
                   <a:schemeClr val="dk1"/>
                 </a:solidFill>
@@ -18550,7 +18803,7 @@
               </a:rPr>
               <a:t> ∂Ω .</a:t>
             </a:r>
-            <a:endParaRPr sz="1800" b="0" i="0" u="none" strike="noStrike" cap="none">
+            <a:endParaRPr sz="1800" b="0" i="0" u="none" strike="noStrike" cap="none" dirty="0">
               <a:solidFill>
                 <a:schemeClr val="dk1"/>
               </a:solidFill>

</xml_diff>